<commit_message>
Made updates to my PPP, as well as the supporting documents.
</commit_message>
<xml_diff>
--- a/docs/diagrams/SortedListCommand1ListStateDiagram.pptx
+++ b/docs/diagrams/SortedListCommand1ListStateDiagram.pptx
@@ -261,7 +261,7 @@
           <a:p>
             <a:fld id="{03EC4E3E-8101-482F-A883-8B55DAFF7C07}" type="datetimeFigureOut">
               <a:rPr lang="en-SG" smtClean="0"/>
-              <a:t>16/10/18</a:t>
+              <a:t>8/11/18</a:t>
             </a:fld>
             <a:endParaRPr lang="en-SG"/>
           </a:p>
@@ -461,7 +461,7 @@
           <a:p>
             <a:fld id="{03EC4E3E-8101-482F-A883-8B55DAFF7C07}" type="datetimeFigureOut">
               <a:rPr lang="en-SG" smtClean="0"/>
-              <a:t>16/10/18</a:t>
+              <a:t>8/11/18</a:t>
             </a:fld>
             <a:endParaRPr lang="en-SG"/>
           </a:p>
@@ -671,7 +671,7 @@
           <a:p>
             <a:fld id="{03EC4E3E-8101-482F-A883-8B55DAFF7C07}" type="datetimeFigureOut">
               <a:rPr lang="en-SG" smtClean="0"/>
-              <a:t>16/10/18</a:t>
+              <a:t>8/11/18</a:t>
             </a:fld>
             <a:endParaRPr lang="en-SG"/>
           </a:p>
@@ -871,7 +871,7 @@
           <a:p>
             <a:fld id="{03EC4E3E-8101-482F-A883-8B55DAFF7C07}" type="datetimeFigureOut">
               <a:rPr lang="en-SG" smtClean="0"/>
-              <a:t>16/10/18</a:t>
+              <a:t>8/11/18</a:t>
             </a:fld>
             <a:endParaRPr lang="en-SG"/>
           </a:p>
@@ -1147,7 +1147,7 @@
           <a:p>
             <a:fld id="{03EC4E3E-8101-482F-A883-8B55DAFF7C07}" type="datetimeFigureOut">
               <a:rPr lang="en-SG" smtClean="0"/>
-              <a:t>16/10/18</a:t>
+              <a:t>8/11/18</a:t>
             </a:fld>
             <a:endParaRPr lang="en-SG"/>
           </a:p>
@@ -1415,7 +1415,7 @@
           <a:p>
             <a:fld id="{03EC4E3E-8101-482F-A883-8B55DAFF7C07}" type="datetimeFigureOut">
               <a:rPr lang="en-SG" smtClean="0"/>
-              <a:t>16/10/18</a:t>
+              <a:t>8/11/18</a:t>
             </a:fld>
             <a:endParaRPr lang="en-SG"/>
           </a:p>
@@ -1830,7 +1830,7 @@
           <a:p>
             <a:fld id="{03EC4E3E-8101-482F-A883-8B55DAFF7C07}" type="datetimeFigureOut">
               <a:rPr lang="en-SG" smtClean="0"/>
-              <a:t>16/10/18</a:t>
+              <a:t>8/11/18</a:t>
             </a:fld>
             <a:endParaRPr lang="en-SG"/>
           </a:p>
@@ -1972,7 +1972,7 @@
           <a:p>
             <a:fld id="{03EC4E3E-8101-482F-A883-8B55DAFF7C07}" type="datetimeFigureOut">
               <a:rPr lang="en-SG" smtClean="0"/>
-              <a:t>16/10/18</a:t>
+              <a:t>8/11/18</a:t>
             </a:fld>
             <a:endParaRPr lang="en-SG"/>
           </a:p>
@@ -2085,7 +2085,7 @@
           <a:p>
             <a:fld id="{03EC4E3E-8101-482F-A883-8B55DAFF7C07}" type="datetimeFigureOut">
               <a:rPr lang="en-SG" smtClean="0"/>
-              <a:t>16/10/18</a:t>
+              <a:t>8/11/18</a:t>
             </a:fld>
             <a:endParaRPr lang="en-SG"/>
           </a:p>
@@ -2398,7 +2398,7 @@
           <a:p>
             <a:fld id="{03EC4E3E-8101-482F-A883-8B55DAFF7C07}" type="datetimeFigureOut">
               <a:rPr lang="en-SG" smtClean="0"/>
-              <a:t>16/10/18</a:t>
+              <a:t>8/11/18</a:t>
             </a:fld>
             <a:endParaRPr lang="en-SG"/>
           </a:p>
@@ -2687,7 +2687,7 @@
           <a:p>
             <a:fld id="{03EC4E3E-8101-482F-A883-8B55DAFF7C07}" type="datetimeFigureOut">
               <a:rPr lang="en-SG" smtClean="0"/>
-              <a:t>16/10/18</a:t>
+              <a:t>8/11/18</a:t>
             </a:fld>
             <a:endParaRPr lang="en-SG"/>
           </a:p>
@@ -2930,7 +2930,7 @@
           <a:p>
             <a:fld id="{03EC4E3E-8101-482F-A883-8B55DAFF7C07}" type="datetimeFigureOut">
               <a:rPr lang="en-SG" smtClean="0"/>
-              <a:t>16/10/18</a:t>
+              <a:t>8/11/18</a:t>
             </a:fld>
             <a:endParaRPr lang="en-SG"/>
           </a:p>
@@ -3347,12 +3347,176 @@
           <a:chExt cx="0" cy="0"/>
         </a:xfrm>
       </p:grpSpPr>
+      <p:sp>
+        <p:nvSpPr>
+          <p:cNvPr id="8" name="Rectangle 7">
+            <a:extLst>
+              <a:ext uri="{FF2B5EF4-FFF2-40B4-BE49-F238E27FC236}">
+                <a16:creationId xmlns:a16="http://schemas.microsoft.com/office/drawing/2014/main" id="{F6A39A56-FBCA-B440-9A25-8C4AA6DF61FF}"/>
+              </a:ext>
+            </a:extLst>
+          </p:cNvPr>
+          <p:cNvSpPr/>
+          <p:nvPr/>
+        </p:nvSpPr>
+        <p:spPr>
+          <a:xfrm>
+            <a:off x="1400157" y="816942"/>
+            <a:ext cx="9391686" cy="618187"/>
+          </a:xfrm>
+          <a:prstGeom prst="rect">
+            <a:avLst/>
+          </a:prstGeom>
+          <a:noFill/>
+          <a:ln>
+            <a:solidFill>
+              <a:schemeClr val="tx1"/>
+            </a:solidFill>
+          </a:ln>
+        </p:spPr>
+        <p:style>
+          <a:lnRef idx="2">
+            <a:schemeClr val="accent1">
+              <a:shade val="50000"/>
+            </a:schemeClr>
+          </a:lnRef>
+          <a:fillRef idx="1">
+            <a:schemeClr val="accent1"/>
+          </a:fillRef>
+          <a:effectRef idx="0">
+            <a:schemeClr val="accent1"/>
+          </a:effectRef>
+          <a:fontRef idx="minor">
+            <a:schemeClr val="lt1"/>
+          </a:fontRef>
+        </p:style>
+        <p:txBody>
+          <a:bodyPr rtlCol="0" anchor="ctr"/>
+          <a:lstStyle/>
+          <a:p>
+            <a:pPr algn="ctr"/>
+            <a:endParaRPr lang="en-US"/>
+          </a:p>
+        </p:txBody>
+      </p:sp>
+      <p:sp>
+        <p:nvSpPr>
+          <p:cNvPr id="10" name="Down Arrow 9">
+            <a:extLst>
+              <a:ext uri="{FF2B5EF4-FFF2-40B4-BE49-F238E27FC236}">
+                <a16:creationId xmlns:a16="http://schemas.microsoft.com/office/drawing/2014/main" id="{AA8B50E9-82D3-5F44-89B9-CAACD90C6926}"/>
+              </a:ext>
+            </a:extLst>
+          </p:cNvPr>
+          <p:cNvSpPr/>
+          <p:nvPr/>
+        </p:nvSpPr>
+        <p:spPr>
+          <a:xfrm>
+            <a:off x="5101270" y="1526507"/>
+            <a:ext cx="1989460" cy="1549831"/>
+          </a:xfrm>
+          <a:prstGeom prst="downArrow">
+            <a:avLst/>
+          </a:prstGeom>
+        </p:spPr>
+        <p:style>
+          <a:lnRef idx="2">
+            <a:schemeClr val="accent1">
+              <a:shade val="50000"/>
+            </a:schemeClr>
+          </a:lnRef>
+          <a:fillRef idx="1">
+            <a:schemeClr val="accent1"/>
+          </a:fillRef>
+          <a:effectRef idx="0">
+            <a:schemeClr val="accent1"/>
+          </a:effectRef>
+          <a:fontRef idx="minor">
+            <a:schemeClr val="lt1"/>
+          </a:fontRef>
+        </p:style>
+        <p:txBody>
+          <a:bodyPr rtlCol="0" anchor="ctr"/>
+          <a:lstStyle/>
+          <a:p>
+            <a:pPr algn="ctr"/>
+            <a:r>
+              <a:rPr lang="en-US" dirty="0"/>
+              <a:t>Add</a:t>
+            </a:r>
+          </a:p>
+          <a:p>
+            <a:pPr algn="ctr"/>
+            <a:r>
+              <a:rPr lang="en-US" dirty="0"/>
+              <a:t>n/David…</a:t>
+            </a:r>
+          </a:p>
+          <a:p>
+            <a:pPr algn="ctr"/>
+            <a:endParaRPr lang="en-US" dirty="0"/>
+          </a:p>
+        </p:txBody>
+      </p:sp>
+      <p:sp>
+        <p:nvSpPr>
+          <p:cNvPr id="11" name="Rectangle 10">
+            <a:extLst>
+              <a:ext uri="{FF2B5EF4-FFF2-40B4-BE49-F238E27FC236}">
+                <a16:creationId xmlns:a16="http://schemas.microsoft.com/office/drawing/2014/main" id="{A108D0A1-A7BC-BF42-8D76-C55777A79653}"/>
+              </a:ext>
+            </a:extLst>
+          </p:cNvPr>
+          <p:cNvSpPr/>
+          <p:nvPr/>
+        </p:nvSpPr>
+        <p:spPr>
+          <a:xfrm>
+            <a:off x="1400157" y="3167716"/>
+            <a:ext cx="9391686" cy="618187"/>
+          </a:xfrm>
+          <a:prstGeom prst="rect">
+            <a:avLst/>
+          </a:prstGeom>
+          <a:noFill/>
+          <a:ln>
+            <a:solidFill>
+              <a:schemeClr val="tx1"/>
+            </a:solidFill>
+          </a:ln>
+        </p:spPr>
+        <p:style>
+          <a:lnRef idx="2">
+            <a:schemeClr val="accent1">
+              <a:shade val="50000"/>
+            </a:schemeClr>
+          </a:lnRef>
+          <a:fillRef idx="1">
+            <a:schemeClr val="accent1"/>
+          </a:fillRef>
+          <a:effectRef idx="0">
+            <a:schemeClr val="accent1"/>
+          </a:effectRef>
+          <a:fontRef idx="minor">
+            <a:schemeClr val="lt1"/>
+          </a:fontRef>
+        </p:style>
+        <p:txBody>
+          <a:bodyPr rtlCol="0" anchor="ctr"/>
+          <a:lstStyle/>
+          <a:p>
+            <a:pPr algn="ctr"/>
+            <a:endParaRPr lang="en-US"/>
+          </a:p>
+        </p:txBody>
+      </p:sp>
       <p:graphicFrame>
         <p:nvGraphicFramePr>
-          <p:cNvPr id="17" name="Table 16">
-            <a:extLst>
-              <a:ext uri="{FF2B5EF4-FFF2-40B4-BE49-F238E27FC236}">
-                <a16:creationId xmlns:a16="http://schemas.microsoft.com/office/drawing/2014/main" id="{F545FAB8-F1CE-4886-9BDE-E772BCB0A9C4}"/>
+          <p:cNvPr id="15" name="Table 14">
+            <a:extLst>
+              <a:ext uri="{FF2B5EF4-FFF2-40B4-BE49-F238E27FC236}">
+                <a16:creationId xmlns:a16="http://schemas.microsoft.com/office/drawing/2014/main" id="{069093E9-1042-4843-BF99-1D326EE0F6CC}"/>
               </a:ext>
             </a:extLst>
           </p:cNvPr>
@@ -3362,14 +3526,14 @@
           <p:nvPr>
             <p:extLst>
               <p:ext uri="{D42A27DB-BD31-4B8C-83A1-F6EECF244321}">
-                <p14:modId xmlns:p14="http://schemas.microsoft.com/office/powerpoint/2010/main" val="3082899103"/>
+                <p14:modId xmlns:p14="http://schemas.microsoft.com/office/powerpoint/2010/main" val="294256323"/>
               </p:ext>
             </p:extLst>
           </p:nvPr>
         </p:nvGraphicFramePr>
         <p:xfrm>
-          <a:off x="638040" y="3678567"/>
-          <a:ext cx="1438731" cy="417888"/>
+          <a:off x="1562887" y="3267087"/>
+          <a:ext cx="1593716" cy="417888"/>
         </p:xfrm>
         <a:graphic>
           <a:graphicData uri="http://schemas.openxmlformats.org/drawingml/2006/table">
@@ -3378,7 +3542,7 @@
                 <a:tableStyleId>{638B1855-1B75-4FBE-930C-398BA8C253C6}</a:tableStyleId>
               </a:tblPr>
               <a:tblGrid>
-                <a:gridCol w="1438731">
+                <a:gridCol w="1593716">
                   <a:extLst>
                     <a:ext uri="{9D8B030D-6E8A-4147-A177-3AD203B41FA5}">
                       <a16:colId xmlns:a16="http://schemas.microsoft.com/office/drawing/2014/main" val="4240773277"/>
@@ -3415,170 +3579,6 @@
           </a:graphicData>
         </a:graphic>
       </p:graphicFrame>
-      <p:sp>
-        <p:nvSpPr>
-          <p:cNvPr id="7" name="Rectangle 6">
-            <a:extLst>
-              <a:ext uri="{FF2B5EF4-FFF2-40B4-BE49-F238E27FC236}">
-                <a16:creationId xmlns:a16="http://schemas.microsoft.com/office/drawing/2014/main" id="{178DAF94-8485-F54E-9801-738F776B7CB3}"/>
-              </a:ext>
-            </a:extLst>
-          </p:cNvPr>
-          <p:cNvSpPr/>
-          <p:nvPr/>
-        </p:nvSpPr>
-        <p:spPr>
-          <a:xfrm>
-            <a:off x="529554" y="557862"/>
-            <a:ext cx="11364686" cy="618187"/>
-          </a:xfrm>
-          <a:prstGeom prst="rect">
-            <a:avLst/>
-          </a:prstGeom>
-          <a:noFill/>
-          <a:ln>
-            <a:solidFill>
-              <a:schemeClr val="tx1"/>
-            </a:solidFill>
-          </a:ln>
-        </p:spPr>
-        <p:style>
-          <a:lnRef idx="2">
-            <a:schemeClr val="accent1">
-              <a:shade val="50000"/>
-            </a:schemeClr>
-          </a:lnRef>
-          <a:fillRef idx="1">
-            <a:schemeClr val="accent1"/>
-          </a:fillRef>
-          <a:effectRef idx="0">
-            <a:schemeClr val="accent1"/>
-          </a:effectRef>
-          <a:fontRef idx="minor">
-            <a:schemeClr val="lt1"/>
-          </a:fontRef>
-        </p:style>
-        <p:txBody>
-          <a:bodyPr rtlCol="0" anchor="ctr"/>
-          <a:lstStyle/>
-          <a:p>
-            <a:pPr algn="ctr"/>
-            <a:endParaRPr lang="en-US"/>
-          </a:p>
-        </p:txBody>
-      </p:sp>
-      <p:sp>
-        <p:nvSpPr>
-          <p:cNvPr id="3" name="Down Arrow 2">
-            <a:extLst>
-              <a:ext uri="{FF2B5EF4-FFF2-40B4-BE49-F238E27FC236}">
-                <a16:creationId xmlns:a16="http://schemas.microsoft.com/office/drawing/2014/main" id="{32E0F71A-E3F7-2349-BB8F-DFAB9A2B3CCD}"/>
-              </a:ext>
-            </a:extLst>
-          </p:cNvPr>
-          <p:cNvSpPr/>
-          <p:nvPr/>
-        </p:nvSpPr>
-        <p:spPr>
-          <a:xfrm>
-            <a:off x="5281998" y="1602707"/>
-            <a:ext cx="1859797" cy="1549831"/>
-          </a:xfrm>
-          <a:prstGeom prst="downArrow">
-            <a:avLst/>
-          </a:prstGeom>
-        </p:spPr>
-        <p:style>
-          <a:lnRef idx="2">
-            <a:schemeClr val="accent1">
-              <a:shade val="50000"/>
-            </a:schemeClr>
-          </a:lnRef>
-          <a:fillRef idx="1">
-            <a:schemeClr val="accent1"/>
-          </a:fillRef>
-          <a:effectRef idx="0">
-            <a:schemeClr val="accent1"/>
-          </a:effectRef>
-          <a:fontRef idx="minor">
-            <a:schemeClr val="lt1"/>
-          </a:fontRef>
-        </p:style>
-        <p:txBody>
-          <a:bodyPr rtlCol="0" anchor="ctr"/>
-          <a:lstStyle/>
-          <a:p>
-            <a:pPr algn="ctr"/>
-            <a:r>
-              <a:rPr lang="en-US" dirty="0"/>
-              <a:t>Add</a:t>
-            </a:r>
-          </a:p>
-          <a:p>
-            <a:pPr algn="ctr"/>
-            <a:r>
-              <a:rPr lang="en-US" dirty="0"/>
-              <a:t>n/David…</a:t>
-            </a:r>
-          </a:p>
-          <a:p>
-            <a:pPr algn="ctr"/>
-            <a:endParaRPr lang="en-US" dirty="0"/>
-          </a:p>
-        </p:txBody>
-      </p:sp>
-      <p:sp>
-        <p:nvSpPr>
-          <p:cNvPr id="9" name="Rectangle 8">
-            <a:extLst>
-              <a:ext uri="{FF2B5EF4-FFF2-40B4-BE49-F238E27FC236}">
-                <a16:creationId xmlns:a16="http://schemas.microsoft.com/office/drawing/2014/main" id="{3111C0ED-D4B6-FF40-8A3A-B2F13D011E28}"/>
-              </a:ext>
-            </a:extLst>
-          </p:cNvPr>
-          <p:cNvSpPr/>
-          <p:nvPr/>
-        </p:nvSpPr>
-        <p:spPr>
-          <a:xfrm>
-            <a:off x="529554" y="3579196"/>
-            <a:ext cx="11364686" cy="618187"/>
-          </a:xfrm>
-          <a:prstGeom prst="rect">
-            <a:avLst/>
-          </a:prstGeom>
-          <a:noFill/>
-          <a:ln>
-            <a:solidFill>
-              <a:schemeClr val="tx1"/>
-            </a:solidFill>
-          </a:ln>
-        </p:spPr>
-        <p:style>
-          <a:lnRef idx="2">
-            <a:schemeClr val="accent1">
-              <a:shade val="50000"/>
-            </a:schemeClr>
-          </a:lnRef>
-          <a:fillRef idx="1">
-            <a:schemeClr val="accent1"/>
-          </a:fillRef>
-          <a:effectRef idx="0">
-            <a:schemeClr val="accent1"/>
-          </a:effectRef>
-          <a:fontRef idx="minor">
-            <a:schemeClr val="lt1"/>
-          </a:fontRef>
-        </p:style>
-        <p:txBody>
-          <a:bodyPr rtlCol="0" anchor="ctr"/>
-          <a:lstStyle/>
-          <a:p>
-            <a:pPr algn="ctr"/>
-            <a:endParaRPr lang="en-US"/>
-          </a:p>
-        </p:txBody>
-      </p:sp>
     </p:spTree>
     <p:extLst>
       <p:ext uri="{BB962C8B-B14F-4D97-AF65-F5344CB8AC3E}">

</xml_diff>